<commit_message>
Promijenjena pozadinska boja prezentacije
</commit_message>
<xml_diff>
--- a/Aplikacija za organizaciju demosa za računarske praktikume te.pptx
+++ b/Aplikacija za organizaciju demosa za računarske praktikume te.pptx
@@ -120,6 +120,11 @@
       </a:defRPr>
     </a:lvl9pPr>
   </p:defaultTextStyle>
+  <p:extLst>
+    <p:ext uri="{EFAFB233-063F-42B5-8137-9DF3F51BA10A}">
+      <p15:sldGuideLst xmlns:p15="http://schemas.microsoft.com/office/powerpoint/2012/main"/>
+    </p:ext>
+  </p:extLst>
 </p:presentation>
 </file>
 
@@ -309,7 +314,7 @@
           <a:p>
             <a:fld id="{6EDAAA84-1BAE-433E-A720-ABFDC1AB93A5}" type="datetimeFigureOut">
               <a:rPr lang="en-US" smtClean="0"/>
-              <a:t>7/4/2024</a:t>
+              <a:t>7/5/2024</a:t>
             </a:fld>
             <a:endParaRPr lang="en-US"/>
           </a:p>
@@ -584,7 +589,7 @@
           <a:p>
             <a:fld id="{6EDAAA84-1BAE-433E-A720-ABFDC1AB93A5}" type="datetimeFigureOut">
               <a:rPr lang="en-US" smtClean="0"/>
-              <a:t>7/4/2024</a:t>
+              <a:t>7/5/2024</a:t>
             </a:fld>
             <a:endParaRPr lang="en-US"/>
           </a:p>
@@ -778,7 +783,7 @@
           <a:p>
             <a:fld id="{6EDAAA84-1BAE-433E-A720-ABFDC1AB93A5}" type="datetimeFigureOut">
               <a:rPr lang="en-US" smtClean="0"/>
-              <a:t>7/4/2024</a:t>
+              <a:t>7/5/2024</a:t>
             </a:fld>
             <a:endParaRPr lang="en-US"/>
           </a:p>
@@ -1051,7 +1056,7 @@
           <a:p>
             <a:fld id="{6EDAAA84-1BAE-433E-A720-ABFDC1AB93A5}" type="datetimeFigureOut">
               <a:rPr lang="en-US" smtClean="0"/>
-              <a:t>7/4/2024</a:t>
+              <a:t>7/5/2024</a:t>
             </a:fld>
             <a:endParaRPr lang="en-US"/>
           </a:p>
@@ -1392,7 +1397,7 @@
           <a:p>
             <a:fld id="{6EDAAA84-1BAE-433E-A720-ABFDC1AB93A5}" type="datetimeFigureOut">
               <a:rPr lang="en-US" smtClean="0"/>
-              <a:t>7/4/2024</a:t>
+              <a:t>7/5/2024</a:t>
             </a:fld>
             <a:endParaRPr lang="en-US"/>
           </a:p>
@@ -2015,7 +2020,7 @@
           <a:p>
             <a:fld id="{6EDAAA84-1BAE-433E-A720-ABFDC1AB93A5}" type="datetimeFigureOut">
               <a:rPr lang="en-US" smtClean="0"/>
-              <a:t>7/4/2024</a:t>
+              <a:t>7/5/2024</a:t>
             </a:fld>
             <a:endParaRPr lang="en-US"/>
           </a:p>
@@ -2875,7 +2880,7 @@
           <a:p>
             <a:fld id="{6EDAAA84-1BAE-433E-A720-ABFDC1AB93A5}" type="datetimeFigureOut">
               <a:rPr lang="en-US" smtClean="0"/>
-              <a:t>7/4/2024</a:t>
+              <a:t>7/5/2024</a:t>
             </a:fld>
             <a:endParaRPr lang="en-US"/>
           </a:p>
@@ -3045,7 +3050,7 @@
           <a:p>
             <a:fld id="{6EDAAA84-1BAE-433E-A720-ABFDC1AB93A5}" type="datetimeFigureOut">
               <a:rPr lang="en-US" smtClean="0"/>
-              <a:t>7/4/2024</a:t>
+              <a:t>7/5/2024</a:t>
             </a:fld>
             <a:endParaRPr lang="en-US"/>
           </a:p>
@@ -3225,7 +3230,7 @@
           <a:p>
             <a:fld id="{6EDAAA84-1BAE-433E-A720-ABFDC1AB93A5}" type="datetimeFigureOut">
               <a:rPr lang="en-US" smtClean="0"/>
-              <a:t>7/4/2024</a:t>
+              <a:t>7/5/2024</a:t>
             </a:fld>
             <a:endParaRPr lang="en-US"/>
           </a:p>
@@ -3395,7 +3400,7 @@
           <a:p>
             <a:fld id="{6EDAAA84-1BAE-433E-A720-ABFDC1AB93A5}" type="datetimeFigureOut">
               <a:rPr lang="en-US" smtClean="0"/>
-              <a:t>7/4/2024</a:t>
+              <a:t>7/5/2024</a:t>
             </a:fld>
             <a:endParaRPr lang="en-US"/>
           </a:p>
@@ -3642,7 +3647,7 @@
           <a:p>
             <a:fld id="{6EDAAA84-1BAE-433E-A720-ABFDC1AB93A5}" type="datetimeFigureOut">
               <a:rPr lang="en-US" smtClean="0"/>
-              <a:t>7/4/2024</a:t>
+              <a:t>7/5/2024</a:t>
             </a:fld>
             <a:endParaRPr lang="en-US"/>
           </a:p>
@@ -3934,7 +3939,7 @@
           <a:p>
             <a:fld id="{6EDAAA84-1BAE-433E-A720-ABFDC1AB93A5}" type="datetimeFigureOut">
               <a:rPr lang="en-US" smtClean="0"/>
-              <a:t>7/4/2024</a:t>
+              <a:t>7/5/2024</a:t>
             </a:fld>
             <a:endParaRPr lang="en-US"/>
           </a:p>
@@ -4378,7 +4383,7 @@
           <a:p>
             <a:fld id="{6EDAAA84-1BAE-433E-A720-ABFDC1AB93A5}" type="datetimeFigureOut">
               <a:rPr lang="en-US" smtClean="0"/>
-              <a:t>7/4/2024</a:t>
+              <a:t>7/5/2024</a:t>
             </a:fld>
             <a:endParaRPr lang="en-US"/>
           </a:p>
@@ -4496,7 +4501,7 @@
           <a:p>
             <a:fld id="{6EDAAA84-1BAE-433E-A720-ABFDC1AB93A5}" type="datetimeFigureOut">
               <a:rPr lang="en-US" smtClean="0"/>
-              <a:t>7/4/2024</a:t>
+              <a:t>7/5/2024</a:t>
             </a:fld>
             <a:endParaRPr lang="en-US"/>
           </a:p>
@@ -4591,7 +4596,7 @@
           <a:p>
             <a:fld id="{6EDAAA84-1BAE-433E-A720-ABFDC1AB93A5}" type="datetimeFigureOut">
               <a:rPr lang="en-US" smtClean="0"/>
-              <a:t>7/4/2024</a:t>
+              <a:t>7/5/2024</a:t>
             </a:fld>
             <a:endParaRPr lang="en-US"/>
           </a:p>
@@ -4870,7 +4875,7 @@
           <a:p>
             <a:fld id="{6EDAAA84-1BAE-433E-A720-ABFDC1AB93A5}" type="datetimeFigureOut">
               <a:rPr lang="en-US" smtClean="0"/>
-              <a:t>7/4/2024</a:t>
+              <a:t>7/5/2024</a:t>
             </a:fld>
             <a:endParaRPr lang="en-US"/>
           </a:p>
@@ -5145,7 +5150,7 @@
           <a:p>
             <a:fld id="{6EDAAA84-1BAE-433E-A720-ABFDC1AB93A5}" type="datetimeFigureOut">
               <a:rPr lang="en-US" smtClean="0"/>
-              <a:t>7/4/2024</a:t>
+              <a:t>7/5/2024</a:t>
             </a:fld>
             <a:endParaRPr lang="en-US"/>
           </a:p>
@@ -5574,7 +5579,7 @@
           <a:p>
             <a:fld id="{6EDAAA84-1BAE-433E-A720-ABFDC1AB93A5}" type="datetimeFigureOut">
               <a:rPr lang="en-US" smtClean="0"/>
-              <a:t>7/4/2024</a:t>
+              <a:t>7/5/2024</a:t>
             </a:fld>
             <a:endParaRPr lang="en-US"/>
           </a:p>
@@ -6285,7 +6290,9 @@
     <p:bg>
       <p:bgPr>
         <a:solidFill>
-          <a:schemeClr val="bg1"/>
+          <a:schemeClr val="bg1">
+            <a:lumMod val="85000"/>
+          </a:schemeClr>
         </a:solidFill>
         <a:effectLst/>
       </p:bgPr>
@@ -7437,7 +7444,9 @@
     <p:bg>
       <p:bgPr>
         <a:solidFill>
-          <a:schemeClr val="bg1"/>
+          <a:schemeClr val="bg1">
+            <a:lumMod val="85000"/>
+          </a:schemeClr>
         </a:solidFill>
         <a:effectLst/>
       </p:bgPr>
@@ -8589,7 +8598,9 @@
     <p:bg>
       <p:bgPr>
         <a:solidFill>
-          <a:schemeClr val="bg2"/>
+          <a:schemeClr val="bg1">
+            <a:lumMod val="85000"/>
+          </a:schemeClr>
         </a:solidFill>
         <a:effectLst/>
       </p:bgPr>
@@ -9753,7 +9764,9 @@
     <p:bg>
       <p:bgPr>
         <a:solidFill>
-          <a:schemeClr val="bg1"/>
+          <a:schemeClr val="bg1">
+            <a:lumMod val="85000"/>
+          </a:schemeClr>
         </a:solidFill>
         <a:effectLst/>
       </p:bgPr>
@@ -10935,7 +10948,9 @@
     <p:bg>
       <p:bgPr>
         <a:solidFill>
-          <a:schemeClr val="bg2"/>
+          <a:schemeClr val="bg1">
+            <a:lumMod val="85000"/>
+          </a:schemeClr>
         </a:solidFill>
         <a:effectLst/>
       </p:bgPr>
@@ -12069,7 +12084,9 @@
     <p:bg>
       <p:bgPr>
         <a:solidFill>
-          <a:schemeClr val="bg1"/>
+          <a:schemeClr val="bg1">
+            <a:lumMod val="85000"/>
+          </a:schemeClr>
         </a:solidFill>
         <a:effectLst/>
       </p:bgPr>
@@ -13251,7 +13268,9 @@
     <p:bg>
       <p:bgPr>
         <a:solidFill>
-          <a:schemeClr val="bg1"/>
+          <a:schemeClr val="bg1">
+            <a:lumMod val="85000"/>
+          </a:schemeClr>
         </a:solidFill>
         <a:effectLst/>
       </p:bgPr>
@@ -14518,7 +14537,9 @@
     <p:bg>
       <p:bgPr>
         <a:solidFill>
-          <a:schemeClr val="bg1"/>
+          <a:schemeClr val="bg1">
+            <a:lumMod val="85000"/>
+          </a:schemeClr>
         </a:solidFill>
         <a:effectLst/>
       </p:bgPr>
@@ -15748,7 +15769,9 @@
     <p:bg>
       <p:bgPr>
         <a:solidFill>
-          <a:schemeClr val="bg2"/>
+          <a:schemeClr val="bg1">
+            <a:lumMod val="85000"/>
+          </a:schemeClr>
         </a:solidFill>
         <a:effectLst/>
       </p:bgPr>
@@ -16896,7 +16919,9 @@
     <p:bg>
       <p:bgPr>
         <a:solidFill>
-          <a:schemeClr val="bg1"/>
+          <a:schemeClr val="bg1">
+            <a:lumMod val="85000"/>
+          </a:schemeClr>
         </a:solidFill>
         <a:effectLst/>
       </p:bgPr>
@@ -18108,7 +18133,9 @@
     <p:bg>
       <p:bgPr>
         <a:solidFill>
-          <a:schemeClr val="bg1"/>
+          <a:schemeClr val="bg1">
+            <a:lumMod val="85000"/>
+          </a:schemeClr>
         </a:solidFill>
         <a:effectLst/>
       </p:bgPr>
@@ -19290,7 +19317,9 @@
     <p:bg>
       <p:bgPr>
         <a:solidFill>
-          <a:schemeClr val="bg1"/>
+          <a:schemeClr val="bg1">
+            <a:lumMod val="85000"/>
+          </a:schemeClr>
         </a:solidFill>
         <a:effectLst/>
       </p:bgPr>
@@ -20476,7 +20505,9 @@
     <p:bg>
       <p:bgPr>
         <a:solidFill>
-          <a:schemeClr val="bg1"/>
+          <a:schemeClr val="bg1">
+            <a:lumMod val="85000"/>
+          </a:schemeClr>
         </a:solidFill>
         <a:effectLst/>
       </p:bgPr>
@@ -22748,7 +22779,9 @@
     <p:bg>
       <p:bgPr>
         <a:solidFill>
-          <a:schemeClr val="bg1"/>
+          <a:schemeClr val="bg1">
+            <a:lumMod val="85000"/>
+          </a:schemeClr>
         </a:solidFill>
         <a:effectLst/>
       </p:bgPr>

</xml_diff>

<commit_message>
Dodana finalna verzija prezentacije
</commit_message>
<xml_diff>
--- a/Aplikacija za organizaciju demosa za računarske praktikume te.pptx
+++ b/Aplikacija za organizaciju demosa za računarske praktikume te.pptx
@@ -22341,6 +22341,12 @@
           <a:p>
             <a:r>
               <a:rPr lang="hr-HR" dirty="0"/>
+              <a:t>Nalazi se u bazi kasnar(phpMyAdmin)</a:t>
+            </a:r>
+          </a:p>
+          <a:p>
+            <a:r>
+              <a:rPr lang="hr-HR" dirty="0"/>
               <a:t>Baza sadrži 4 tablice</a:t>
             </a:r>
           </a:p>

</xml_diff>